<commit_message>
add some changes to slide of dynamic proxy
</commit_message>
<xml_diff>
--- a/DYNAMIC PROXY.pptx
+++ b/DYNAMIC PROXY.pptx
@@ -8169,18 +8169,7 @@
                   </a:schemeClr>
                 </a:solidFill>
               </a:rPr>
-              <a:t>Presented by </a:t>
-            </a:r>
-            <a:r>
-              <a:rPr lang="en-US" dirty="0" smtClean="0">
-                <a:solidFill>
-                  <a:schemeClr val="tx1">
-                    <a:lumMod val="85000"/>
-                    <a:lumOff val="15000"/>
-                  </a:schemeClr>
-                </a:solidFill>
-              </a:rPr>
-              <a:t>Mohammad Nasr</a:t>
+              <a:t>Presented by Mohammad Nasr</a:t>
             </a:r>
             <a:endParaRPr lang="en-US" sz="2400" dirty="0">
               <a:solidFill>
@@ -8304,7 +8293,7 @@
         </p:blipFill>
         <p:spPr>
           <a:xfrm>
-            <a:off x="213841" y="939998"/>
+            <a:off x="270402" y="1335924"/>
             <a:ext cx="5330311" cy="4787033"/>
           </a:xfrm>
           <a:prstGeom prst="rect">
@@ -8328,7 +8317,7 @@
         </p:blipFill>
         <p:spPr>
           <a:xfrm>
-            <a:off x="5820880" y="939999"/>
+            <a:off x="5792600" y="1335924"/>
             <a:ext cx="5748685" cy="4710029"/>
           </a:xfrm>
           <a:prstGeom prst="rect">
@@ -8580,8 +8569,12 @@
               <a:buAutoNum type="arabicPeriod"/>
             </a:pPr>
             <a:r>
+              <a:rPr lang="en-US" b="1" u="sng" dirty="0" smtClean="0"/>
+              <a:t>Interface definition </a:t>
+            </a:r>
+            <a:r>
               <a:rPr lang="en-US" dirty="0" smtClean="0"/>
-              <a:t>Interface definition : </a:t>
+              <a:t>: </a:t>
             </a:r>
             <a:r>
               <a:rPr lang="en-US" dirty="0"/>
@@ -8609,11 +8602,19 @@
           <a:p>
             <a:r>
               <a:rPr lang="en-US" dirty="0" smtClean="0"/>
-              <a:t>2. Invocation </a:t>
+              <a:t>2. </a:t>
+            </a:r>
+            <a:r>
+              <a:rPr lang="en-US" b="1" u="sng" dirty="0" smtClean="0"/>
+              <a:t>Invocation </a:t>
+            </a:r>
+            <a:r>
+              <a:rPr lang="en-US" b="1" u="sng" dirty="0"/>
+              <a:t>handler implementation </a:t>
             </a:r>
             <a:r>
               <a:rPr lang="en-US" dirty="0"/>
-              <a:t>handler implementation : You create a class that implements the </a:t>
+              <a:t>: You create a class that implements the </a:t>
             </a:r>
             <a:r>
               <a:rPr lang="en-US" dirty="0" err="1"/>
@@ -8634,7 +8635,11 @@
           <a:p>
             <a:r>
               <a:rPr lang="en-US" dirty="0" smtClean="0"/>
-              <a:t>3. Proxy class generation </a:t>
+              <a:t>3</a:t>
+            </a:r>
+            <a:r>
+              <a:rPr lang="en-US" b="1" u="sng" dirty="0" smtClean="0"/>
+              <a:t>. Proxy class generation </a:t>
             </a:r>
             <a:r>
               <a:rPr lang="en-US" dirty="0"/>
@@ -8649,8 +8654,8 @@
               <a:t>(...), the Java Virtual Machine (JVM) generates a proxy class on-the-fly. This class is created in memory and is not saved to the </a:t>
             </a:r>
             <a:r>
-              <a:rPr lang="en-US" dirty="0" err="1"/>
-              <a:t>filesystem</a:t>
+              <a:rPr lang="en-US" dirty="0" smtClean="0"/>
+              <a:t>file system</a:t>
             </a:r>
             <a:r>
               <a:rPr lang="en-US" dirty="0" smtClean="0"/>
@@ -8666,8 +8671,12 @@
               <a:t>4. </a:t>
             </a:r>
             <a:r>
+              <a:rPr lang="en-US" b="1" u="sng" dirty="0"/>
+              <a:t>Bytecode generation </a:t>
+            </a:r>
+            <a:r>
               <a:rPr lang="en-US" dirty="0"/>
-              <a:t>Bytecode generation : The proxy class is generated dynamically using bytecode generation libraries like ASM (Abstract Syntax Tree-based bytecode manipulation) or Byte Buddy. These libraries allow you to define the structure of the class, methods, and fields </a:t>
+              <a:t>: The proxy class is generated dynamically using bytecode generation libraries like ASM (Abstract Syntax Tree-based bytecode manipulation) or Byte Buddy. These libraries allow you to define the structure of the class, methods, and fields </a:t>
             </a:r>
             <a:r>
               <a:rPr lang="en-US" dirty="0" smtClean="0"/>
@@ -8683,8 +8692,12 @@
               <a:t>5. </a:t>
             </a:r>
             <a:r>
+              <a:rPr lang="en-US" b="1" u="sng" dirty="0"/>
+              <a:t>Class loader </a:t>
+            </a:r>
+            <a:r>
               <a:rPr lang="en-US" dirty="0"/>
-              <a:t>Class loader : The generated bytecode is loaded into the JVM using a </a:t>
+              <a:t>: The generated bytecode is loaded into the JVM using a </a:t>
             </a:r>
             <a:r>
               <a:rPr lang="en-US" dirty="0" smtClean="0"/>
@@ -8705,11 +8718,19 @@
           <a:p>
             <a:r>
               <a:rPr lang="en-US" dirty="0" smtClean="0"/>
-              <a:t>6. Proxy </a:t>
+              <a:t>6. </a:t>
+            </a:r>
+            <a:r>
+              <a:rPr lang="en-US" b="1" u="sng" dirty="0" smtClean="0"/>
+              <a:t>Proxy </a:t>
+            </a:r>
+            <a:r>
+              <a:rPr lang="en-US" b="1" u="sng" dirty="0"/>
+              <a:t>class initialization </a:t>
             </a:r>
             <a:r>
               <a:rPr lang="en-US" dirty="0"/>
-              <a:t>class initialization : </a:t>
+              <a:t>: </a:t>
             </a:r>
             <a:r>
               <a:rPr lang="en-US" dirty="0" smtClean="0"/>
@@ -8720,22 +8741,8 @@
               <a:t>proxy class is initialized, and an instance of it is created. This instance implements the interface specified during proxy creation and delegates method invocations to the </a:t>
             </a:r>
             <a:r>
-              <a:rPr lang="en-US" dirty="0" err="1"/>
+              <a:rPr lang="en-US" dirty="0" err="1" smtClean="0"/>
               <a:t>InvocationHandler</a:t>
-            </a:r>
-            <a:r>
-              <a:rPr lang="en-US" dirty="0"/>
-              <a:t>.</a:t>
-            </a:r>
-          </a:p>
-          <a:p>
-            <a:r>
-              <a:rPr lang="en-US" dirty="0" err="1"/>
-              <a:t>InvocationHandler</a:t>
-            </a:r>
-            <a:r>
-              <a:rPr lang="en-US" dirty="0"/>
-              <a:t> Invocation:</a:t>
             </a:r>
             <a:endParaRPr lang="en-US" dirty="0" smtClean="0"/>
           </a:p>
@@ -8931,7 +8938,7 @@
         <p:spPr>
           <a:xfrm>
             <a:off x="214965" y="481263"/>
-            <a:ext cx="11146055" cy="4247317"/>
+            <a:ext cx="11146055" cy="5078313"/>
           </a:xfrm>
           <a:prstGeom prst="rect">
             <a:avLst/>
@@ -9008,13 +9015,15 @@
           <a:p>
             <a:r>
               <a:rPr lang="en-US" dirty="0" smtClean="0"/>
-              <a:t>For work with CGLIB you need to add bellow dependency to your project that correspond to your build tool</a:t>
-            </a:r>
-          </a:p>
-          <a:p>
+              <a:t>For work with CGLIB you need to add bellow dependency to your project that correspond to your build </a:t>
+            </a:r>
             <a:r>
               <a:rPr lang="en-US" dirty="0" smtClean="0"/>
-              <a:t>If you are maven add following dependency to your pom.xml</a:t>
+              <a:t>tool If </a:t>
+            </a:r>
+            <a:r>
+              <a:rPr lang="en-US" dirty="0" smtClean="0"/>
+              <a:t>you are maven add following dependency to your pom.xml</a:t>
             </a:r>
           </a:p>
         </p:txBody>
@@ -9035,8 +9044,8 @@
         </p:blipFill>
         <p:spPr>
           <a:xfrm>
-            <a:off x="6577263" y="4539916"/>
-            <a:ext cx="3561347" cy="1661716"/>
+            <a:off x="8421842" y="5222449"/>
+            <a:ext cx="3561347" cy="1513002"/>
           </a:xfrm>
           <a:prstGeom prst="rect">
             <a:avLst/>
@@ -9262,12 +9271,8 @@
           </a:p>
           <a:p>
             <a:r>
-              <a:rPr lang="en-US" smtClean="0"/>
-              <a:t>We </a:t>
-            </a:r>
-            <a:r>
               <a:rPr lang="en-US" dirty="0" smtClean="0"/>
-              <a:t>want to explore some key terminology of CGLIB</a:t>
+              <a:t>We want to explore some key terminology of CGLIB</a:t>
             </a:r>
           </a:p>
           <a:p>
@@ -9281,16 +9286,24 @@
               <a:buAutoNum type="arabicPeriod"/>
             </a:pPr>
             <a:r>
+              <a:rPr lang="en-US" b="1" u="sng" dirty="0" smtClean="0"/>
+              <a:t>Enhancer</a:t>
+            </a:r>
+            <a:r>
               <a:rPr lang="en-US" dirty="0" smtClean="0"/>
-              <a:t>Enhancer : </a:t>
+              <a:t> : </a:t>
             </a:r>
             <a:r>
               <a:rPr lang="en-US" dirty="0"/>
-              <a:t>CGLIB operates by enhancing classes at the bytecode level. It generates a subclass of a given class </a:t>
+              <a:t>CGLIB operates by enhancing classes at the bytecode level. It generates a subclass of a given </a:t>
             </a:r>
             <a:r>
               <a:rPr lang="en-US" dirty="0" smtClean="0"/>
-              <a:t>	       (</a:t>
+              <a:t>class  </a:t>
+            </a:r>
+            <a:r>
+              <a:rPr lang="en-US" dirty="0" smtClean="0"/>
+              <a:t>(</a:t>
             </a:r>
             <a:r>
               <a:rPr lang="en-US" dirty="0"/>
@@ -9312,8 +9325,20 @@
               <a:buAutoNum type="arabicPeriod"/>
             </a:pPr>
             <a:r>
+              <a:rPr lang="en-US" b="1" u="sng" dirty="0" smtClean="0"/>
+              <a:t>Dynamic Class Generation </a:t>
+            </a:r>
+            <a:r>
               <a:rPr lang="en-US" dirty="0" smtClean="0"/>
-              <a:t>Dynamic Class Generation : CGLIB dynamically generate a new class during runtime that extend target class or      	                                     implement target interface</a:t>
+              <a:t>: CGLIB dynamically generate a new class during runtime that extend target class </a:t>
+            </a:r>
+            <a:r>
+              <a:rPr lang="en-US" dirty="0" smtClean="0"/>
+              <a:t>or implement </a:t>
+            </a:r>
+            <a:r>
+              <a:rPr lang="en-US" dirty="0" smtClean="0"/>
+              <a:t>target interface</a:t>
             </a:r>
           </a:p>
           <a:p>
@@ -9327,25 +9352,28 @@
               <a:buAutoNum type="arabicPeriod"/>
             </a:pPr>
             <a:r>
+              <a:rPr lang="en-US" b="1" u="sng" dirty="0" smtClean="0"/>
+              <a:t>Method Interception </a:t>
+            </a:r>
+            <a:r>
               <a:rPr lang="en-US" dirty="0" smtClean="0"/>
-              <a:t>Method Interception : it allow to add interception get invoked when method of enhanced class ( proxy class) </a:t>
-            </a:r>
-            <a:endParaRPr lang="en-US" dirty="0"/>
-          </a:p>
-          <a:p>
+              <a:t>: it allow to add interception get invoked when method of enhanced class ( proxy class) </a:t>
+            </a:r>
             <a:r>
               <a:rPr lang="en-US" dirty="0" smtClean="0"/>
-              <a:t>                                           called . It can be used to modify behavior or modify parameter or every logic you want</a:t>
-            </a:r>
-          </a:p>
-          <a:p>
-            <a:r>
-              <a:rPr lang="en-US" dirty="0"/>
-              <a:t>	</a:t>
+              <a:t>called </a:t>
             </a:r>
             <a:r>
               <a:rPr lang="en-US" dirty="0" smtClean="0"/>
-              <a:t>	          to added.</a:t>
+              <a:t>. It can be used to modify behavior or modify parameter or every logic you </a:t>
+            </a:r>
+            <a:r>
+              <a:rPr lang="en-US" dirty="0" smtClean="0"/>
+              <a:t>want </a:t>
+            </a:r>
+            <a:r>
+              <a:rPr lang="en-US" dirty="0" smtClean="0"/>
+              <a:t>to added.</a:t>
             </a:r>
           </a:p>
           <a:p>
@@ -9354,7 +9382,15 @@
           <a:p>
             <a:r>
               <a:rPr lang="en-US" dirty="0" smtClean="0"/>
-              <a:t>4.  No Interface Requirement : unlike JDK proxy can proxy both class and interface .</a:t>
+              <a:t>4.  </a:t>
+            </a:r>
+            <a:r>
+              <a:rPr lang="en-US" b="1" u="sng" dirty="0" smtClean="0"/>
+              <a:t>No Interface Requirement</a:t>
+            </a:r>
+            <a:r>
+              <a:rPr lang="en-US" dirty="0" smtClean="0"/>
+              <a:t> : unlike JDK proxy can proxy both class and interface .</a:t>
             </a:r>
             <a:endParaRPr lang="en-US" dirty="0"/>
           </a:p>
@@ -9550,7 +9586,7 @@
         <p:spPr>
           <a:xfrm>
             <a:off x="214965" y="481263"/>
-            <a:ext cx="11146055" cy="4247317"/>
+            <a:ext cx="11146055" cy="5355312"/>
           </a:xfrm>
           <a:prstGeom prst="rect">
             <a:avLst/>
@@ -9585,8 +9621,12 @@
               <a:buAutoNum type="arabicPeriod"/>
             </a:pPr>
             <a:r>
+              <a:rPr lang="en-US" b="1" u="sng" dirty="0" smtClean="0"/>
+              <a:t>Dynamic Behavior</a:t>
+            </a:r>
+            <a:r>
               <a:rPr lang="en-US" dirty="0" smtClean="0"/>
-              <a:t>Dynamic Behavior : allow create proxy instance dynamically at runtime , provide flexibility and adapt new requirement without changing code structure it cause open close solid principle ( if we modify legacy code violate </a:t>
+              <a:t> : allow create proxy instance dynamically at runtime , provide flexibility and adapt new requirement without changing code structure it cause open close solid principle ( if we modify legacy code violate </a:t>
             </a:r>
             <a:r>
               <a:rPr lang="en-US" dirty="0"/>
@@ -9608,8 +9648,12 @@
               <a:buAutoNum type="arabicPeriod"/>
             </a:pPr>
             <a:r>
+              <a:rPr lang="en-US" b="1" u="sng" dirty="0" smtClean="0"/>
+              <a:t>Interface base </a:t>
+            </a:r>
+            <a:r>
               <a:rPr lang="en-US" dirty="0" smtClean="0"/>
-              <a:t>Interface base : JDK Proxy work only with interface . It cause cleaner design and use code to interface and </a:t>
+              <a:t>: JDK Proxy work only with interface . It cause cleaner design and use code to interface and </a:t>
             </a:r>
           </a:p>
           <a:p>
@@ -9624,7 +9668,15 @@
           <a:p>
             <a:r>
               <a:rPr lang="en-US" dirty="0" smtClean="0"/>
-              <a:t>3. Simplicity : create dynamic proxy using Proxy class in </a:t>
+              <a:t>3. </a:t>
+            </a:r>
+            <a:r>
+              <a:rPr lang="en-US" b="1" u="sng" dirty="0" smtClean="0"/>
+              <a:t>Simplicity</a:t>
+            </a:r>
+            <a:r>
+              <a:rPr lang="en-US" dirty="0" smtClean="0"/>
+              <a:t> : create dynamic proxy using Proxy class in </a:t>
             </a:r>
             <a:r>
               <a:rPr lang="en-US" dirty="0" err="1" smtClean="0"/>
@@ -9641,7 +9693,15 @@
           <a:p>
             <a:r>
               <a:rPr lang="en-US" dirty="0" smtClean="0"/>
-              <a:t>4. Standard library support : it as part of standard library and you don’t need to add additional dependency </a:t>
+              <a:t>4. </a:t>
+            </a:r>
+            <a:r>
+              <a:rPr lang="en-US" b="1" u="sng" dirty="0" smtClean="0"/>
+              <a:t>Standard library support </a:t>
+            </a:r>
+            <a:r>
+              <a:rPr lang="en-US" dirty="0" smtClean="0"/>
+              <a:t>: it as part of standard library and you don’t need to add additional dependency </a:t>
             </a:r>
           </a:p>
           <a:p>
@@ -9728,7 +9788,7 @@
         <p:spPr>
           <a:xfrm>
             <a:off x="214965" y="481263"/>
-            <a:ext cx="11146055" cy="4524315"/>
+            <a:ext cx="11146055" cy="5078313"/>
           </a:xfrm>
           <a:prstGeom prst="rect">
             <a:avLst/>
@@ -9763,8 +9823,20 @@
               <a:buAutoNum type="arabicPeriod"/>
             </a:pPr>
             <a:r>
+              <a:rPr lang="en-US" b="1" u="sng" dirty="0" smtClean="0"/>
+              <a:t>Its interface base </a:t>
+            </a:r>
+            <a:r>
               <a:rPr lang="en-US" dirty="0" smtClean="0"/>
-              <a:t>Its interface base . It can be proxy as interface . If you want to use proxy for class you need to use CGLIB</a:t>
+              <a:t>. It can be proxy as interface . If you want to use proxy for class you need to </a:t>
+            </a:r>
+            <a:r>
+              <a:rPr lang="en-US" dirty="0" smtClean="0"/>
+              <a:t>use </a:t>
+            </a:r>
+            <a:r>
+              <a:rPr lang="en-US" dirty="0" smtClean="0"/>
+              <a:t>CGLIB</a:t>
             </a:r>
           </a:p>
           <a:p>
@@ -9778,8 +9850,28 @@
               <a:buAutoNum type="arabicPeriod"/>
             </a:pPr>
             <a:r>
+              <a:rPr lang="en-US" b="1" u="sng" dirty="0" smtClean="0"/>
+              <a:t>Runtime overhead</a:t>
+            </a:r>
+            <a:r>
               <a:rPr lang="en-US" dirty="0" smtClean="0"/>
-              <a:t>Runtime overhead: there can be some runtime overhead associated with dynamic proxy when compared to  		       static proxy or direct call</a:t>
+              <a:t>: there can be some runtime overhead associated with dynamic proxy when </a:t>
+            </a:r>
+            <a:r>
+              <a:rPr lang="en-US" dirty="0" smtClean="0"/>
+              <a:t>compared </a:t>
+            </a:r>
+            <a:r>
+              <a:rPr lang="en-US" dirty="0" smtClean="0"/>
+              <a:t>to  </a:t>
+            </a:r>
+            <a:r>
+              <a:rPr lang="en-US" dirty="0" smtClean="0"/>
+              <a:t>static </a:t>
+            </a:r>
+            <a:r>
+              <a:rPr lang="en-US" dirty="0" smtClean="0"/>
+              <a:t>proxy or direct call</a:t>
             </a:r>
             <a:endParaRPr lang="en-US" dirty="0"/>
           </a:p>
@@ -9789,7 +9881,15 @@
           <a:p>
             <a:r>
               <a:rPr lang="en-US" dirty="0" smtClean="0"/>
-              <a:t>3. Simplicity : create dynamic proxy using Proxy class in </a:t>
+              <a:t>3. </a:t>
+            </a:r>
+            <a:r>
+              <a:rPr lang="en-US" b="1" u="sng" dirty="0" smtClean="0"/>
+              <a:t>Simplicity</a:t>
+            </a:r>
+            <a:r>
+              <a:rPr lang="en-US" dirty="0" smtClean="0"/>
+              <a:t> : create dynamic proxy using Proxy class in </a:t>
             </a:r>
             <a:r>
               <a:rPr lang="en-US" dirty="0" err="1" smtClean="0"/>
@@ -9797,7 +9897,15 @@
             </a:r>
             <a:r>
               <a:rPr lang="en-US" dirty="0" smtClean="0"/>
-              <a:t> is straightforward and less boilerplate code .</a:t>
+              <a:t> is straightforward and </a:t>
+            </a:r>
+            <a:r>
+              <a:rPr lang="en-US" dirty="0" smtClean="0"/>
+              <a:t>less boilerplate code </a:t>
+            </a:r>
+            <a:r>
+              <a:rPr lang="en-US" dirty="0" smtClean="0"/>
+              <a:t>.</a:t>
             </a:r>
           </a:p>
           <a:p>
@@ -9806,7 +9914,23 @@
           <a:p>
             <a:r>
               <a:rPr lang="en-US" dirty="0" smtClean="0"/>
-              <a:t>4 limited control : provide less control over proxy creation process compared to other mechanism . For some 	              use case you  need to consider alternative solution</a:t>
+              <a:t>4 </a:t>
+            </a:r>
+            <a:r>
+              <a:rPr lang="en-US" b="1" u="sng" dirty="0" smtClean="0"/>
+              <a:t>limited control </a:t>
+            </a:r>
+            <a:r>
+              <a:rPr lang="en-US" dirty="0" smtClean="0"/>
+              <a:t>: provide less control over proxy creation process compared to other mechanism . For some </a:t>
+            </a:r>
+            <a:r>
+              <a:rPr lang="en-US" dirty="0" smtClean="0"/>
+              <a:t>use </a:t>
+            </a:r>
+            <a:r>
+              <a:rPr lang="en-US" dirty="0" smtClean="0"/>
+              <a:t>case you  need to consider alternative solution</a:t>
             </a:r>
           </a:p>
           <a:p>
@@ -9815,7 +9939,15 @@
           <a:p>
             <a:r>
               <a:rPr lang="en-US" dirty="0" smtClean="0"/>
-              <a:t>5. Final method : it can not proxy final method . Because it cant to override that</a:t>
+              <a:t>5. </a:t>
+            </a:r>
+            <a:r>
+              <a:rPr lang="en-US" b="1" u="sng" dirty="0" smtClean="0"/>
+              <a:t>Final method </a:t>
+            </a:r>
+            <a:r>
+              <a:rPr lang="en-US" dirty="0" smtClean="0"/>
+              <a:t>: it can not proxy final method . Because it cant to override that</a:t>
             </a:r>
           </a:p>
           <a:p>
@@ -9904,7 +10036,7 @@
         <p:spPr>
           <a:xfrm>
             <a:off x="1097281" y="1930400"/>
-            <a:ext cx="10058400" cy="4250267"/>
+            <a:ext cx="10337432" cy="4250267"/>
           </a:xfrm>
         </p:spPr>
         <p:txBody>
@@ -9934,11 +10066,7 @@
           <a:p>
             <a:r>
               <a:rPr lang="en-US" sz="4800" dirty="0" smtClean="0"/>
-              <a:t>Those are classify to 3 type </a:t>
-            </a:r>
-            <a:r>
-              <a:rPr lang="en-US" sz="4800" dirty="0" smtClean="0"/>
-              <a:t>:</a:t>
+              <a:t>Those are classify to 3 type :</a:t>
             </a:r>
           </a:p>
           <a:p>
@@ -9949,8 +10077,12 @@
               <a:buNone/>
             </a:pPr>
             <a:r>
+              <a:rPr lang="en-US" sz="4800" b="1" u="sng" dirty="0" smtClean="0"/>
+              <a:t>Creational</a:t>
+            </a:r>
+            <a:r>
               <a:rPr lang="en-US" sz="4800" dirty="0" smtClean="0"/>
-              <a:t>Creational : intent of those pattern is how object created . Design pattern in this category are : </a:t>
+              <a:t> : intent of those pattern is how object created . Design pattern in this category are : </a:t>
             </a:r>
           </a:p>
           <a:p>
@@ -9982,14 +10114,13 @@
               <a:buNone/>
             </a:pPr>
             <a:r>
+              <a:rPr lang="en-US" sz="4800" b="1" u="sng" dirty="0" smtClean="0"/>
+              <a:t>Structural</a:t>
+            </a:r>
+            <a:r>
               <a:rPr lang="en-US" sz="4800" dirty="0" smtClean="0"/>
-              <a:t>Structural </a:t>
-            </a:r>
-            <a:r>
-              <a:rPr lang="en-US" sz="4800" dirty="0" smtClean="0"/>
-              <a:t>: intent of those pattern is composition of class and object and forming larger structure . Design pattern in this category are : </a:t>
-            </a:r>
-            <a:endParaRPr lang="en-US" sz="4800" dirty="0" smtClean="0"/>
+              <a:t> : intent of those pattern is composition of class and object and forming larger structure . Design pattern in this category are : </a:t>
+            </a:r>
           </a:p>
           <a:p>
             <a:pPr marL="201168" lvl="1" indent="0">
@@ -10012,18 +10143,13 @@
               <a:buNone/>
             </a:pPr>
             <a:r>
+              <a:rPr lang="en-US" sz="4800" b="1" u="sng" dirty="0" smtClean="0"/>
+              <a:t>Behavioral</a:t>
+            </a:r>
+            <a:r>
               <a:rPr lang="en-US" sz="4800" dirty="0" smtClean="0"/>
-              <a:t>Behavioral : intent of those pattern is communicate with each other . Design pattern in </a:t>
-            </a:r>
-            <a:r>
-              <a:rPr lang="en-US" sz="4800" dirty="0" smtClean="0"/>
-              <a:t>this </a:t>
-            </a:r>
-            <a:r>
-              <a:rPr lang="en-US" sz="4800" dirty="0" smtClean="0"/>
-              <a:t>category are : </a:t>
-            </a:r>
-            <a:endParaRPr lang="en-US" sz="4800" dirty="0" smtClean="0"/>
+              <a:t> : intent of those pattern is communicate with each other . Design pattern in this category are : </a:t>
+            </a:r>
           </a:p>
           <a:p>
             <a:pPr marL="201168" lvl="1" indent="0">
@@ -10035,17 +10161,12 @@
             </a:r>
             <a:r>
               <a:rPr lang="en-US" sz="4800" b="1" dirty="0" smtClean="0"/>
-              <a:t>Observer . Strategy . Command . Iterator . </a:t>
-            </a:r>
-            <a:r>
-              <a:rPr lang="en-US" sz="4800" b="1" dirty="0" smtClean="0"/>
-              <a:t>Chain Of Responsibility </a:t>
+              <a:t>Observer . Strategy . Command . Iterator . Chain Of Responsibility </a:t>
             </a:r>
             <a:r>
               <a:rPr lang="en-US" sz="4800" dirty="0" smtClean="0"/>
               <a:t>….</a:t>
             </a:r>
-            <a:endParaRPr lang="en-US" sz="4800" dirty="0" smtClean="0"/>
           </a:p>
           <a:p>
             <a:pPr marL="201168" lvl="1" indent="0">
@@ -10059,25 +10180,13 @@
             </a:pPr>
             <a:r>
               <a:rPr lang="en-US" sz="4800" dirty="0" smtClean="0"/>
-              <a:t>We </a:t>
-            </a:r>
+              <a:t>We want to cover Proxy Structural Design pattern as prerequisite of our topic</a:t>
+            </a:r>
+          </a:p>
+          <a:p>
             <a:r>
               <a:rPr lang="en-US" sz="4800" dirty="0" smtClean="0"/>
-              <a:t>want to cover Proxy Structural Design pattern as prerequisite of our topic</a:t>
-            </a:r>
-          </a:p>
-          <a:p>
-            <a:r>
-              <a:rPr lang="en-US" sz="4800" dirty="0" smtClean="0"/>
-              <a:t>Proxy </a:t>
-            </a:r>
-            <a:r>
-              <a:rPr lang="en-US" sz="4800" dirty="0" smtClean="0"/>
-              <a:t>design pattern is structural design pattern that let you provide placeholder for another object . Proxy class allow perform something before </a:t>
-            </a:r>
-            <a:r>
-              <a:rPr lang="en-US" sz="4800" dirty="0" smtClean="0"/>
-              <a:t>or </a:t>
+              <a:t>Proxy design pattern is structural design pattern that let you provide placeholder for another object . Proxy class allow perform something before or </a:t>
             </a:r>
           </a:p>
           <a:p>
@@ -10086,19 +10195,7 @@
             </a:pPr>
             <a:r>
               <a:rPr lang="en-US" sz="4800" dirty="0" smtClean="0"/>
-              <a:t>      </a:t>
-            </a:r>
-            <a:r>
-              <a:rPr lang="en-US" sz="4800" dirty="0" smtClean="0"/>
-              <a:t>either after</a:t>
-            </a:r>
-            <a:r>
-              <a:rPr lang="en-US" sz="4800" dirty="0" smtClean="0"/>
-              <a:t> </a:t>
-            </a:r>
-            <a:r>
-              <a:rPr lang="en-US" sz="4800" dirty="0" smtClean="0"/>
-              <a:t>request goes to original request</a:t>
+              <a:t>      either after request goes to original request</a:t>
             </a:r>
           </a:p>
           <a:p>
@@ -10182,7 +10279,7 @@
         <p:spPr>
           <a:xfrm>
             <a:off x="214965" y="481263"/>
-            <a:ext cx="11146055" cy="3416320"/>
+            <a:ext cx="11146055" cy="4247317"/>
           </a:xfrm>
           <a:prstGeom prst="rect">
             <a:avLst/>
@@ -10217,8 +10314,12 @@
               <a:buAutoNum type="arabicPeriod"/>
             </a:pPr>
             <a:r>
+              <a:rPr lang="en-US" b="1" u="sng" dirty="0" smtClean="0"/>
+              <a:t>It support interface as well as class </a:t>
+            </a:r>
+            <a:r>
               <a:rPr lang="en-US" dirty="0" smtClean="0"/>
-              <a:t>It support interface as well as class : you can proxy for class not just interface this feature give you flexibility</a:t>
+              <a:t>: you can proxy for class not just interface this feature give you flexibility</a:t>
             </a:r>
           </a:p>
           <a:p>
@@ -10243,8 +10344,12 @@
               <a:buAutoNum type="arabicPeriod"/>
             </a:pPr>
             <a:r>
+              <a:rPr lang="en-US" b="1" u="sng" dirty="0" smtClean="0"/>
+              <a:t>Performance</a:t>
+            </a:r>
+            <a:r>
               <a:rPr lang="en-US" dirty="0" smtClean="0"/>
-              <a:t>Performance : it give better performance in some case when proxy class with large number of method </a:t>
+              <a:t> : it give better performance in some case when proxy class with large number of method </a:t>
             </a:r>
             <a:endParaRPr lang="en-US" dirty="0"/>
           </a:p>
@@ -10257,12 +10362,32 @@
               <a:t>3. </a:t>
             </a:r>
             <a:r>
+              <a:rPr lang="en-US" b="1" u="sng" dirty="0"/>
+              <a:t>additional feature</a:t>
+            </a:r>
+            <a:r>
+              <a:rPr lang="en-US" b="1" u="sng" dirty="0" smtClean="0"/>
+              <a:t> </a:t>
+            </a:r>
+            <a:r>
+              <a:rPr lang="en-US" dirty="0" smtClean="0"/>
+              <a:t>: provide additional feature like method interception , method chaining and </a:t>
+            </a:r>
+            <a:r>
               <a:rPr lang="en-US" dirty="0"/>
-              <a:t>additional feature</a:t>
+              <a:t> </a:t>
             </a:r>
             <a:r>
               <a:rPr lang="en-US" dirty="0" smtClean="0"/>
-              <a:t> : provide additional feature like method interception , method chaining and more.</a:t>
+              <a:t>   </a:t>
+            </a:r>
+            <a:r>
+              <a:rPr lang="en-US" dirty="0" smtClean="0"/>
+              <a:t>more</a:t>
+            </a:r>
+            <a:r>
+              <a:rPr lang="en-US" dirty="0" smtClean="0"/>
+              <a:t>.</a:t>
             </a:r>
           </a:p>
           <a:p>
@@ -10387,19 +10512,19 @@
               <a:buAutoNum type="arabicPeriod"/>
             </a:pPr>
             <a:r>
+              <a:rPr lang="en-US" sz="1600" b="1" u="sng" dirty="0" smtClean="0"/>
+              <a:t>Debugging complexity </a:t>
+            </a:r>
+            <a:r>
               <a:rPr lang="en-US" sz="1600" dirty="0" smtClean="0"/>
-              <a:t>Debugging complexity :  debug dynamically generated classes by CGLIB is more complex than standard class</a:t>
+              <a:t>:  debug dynamically generated classes by CGLIB is more complex than standard class</a:t>
             </a:r>
           </a:p>
           <a:p>
             <a:pPr lvl="5"/>
             <a:r>
               <a:rPr lang="en-US" sz="1600" dirty="0" smtClean="0"/>
-              <a:t>   because </a:t>
-            </a:r>
-            <a:r>
-              <a:rPr lang="en-US" sz="1600" dirty="0" smtClean="0"/>
-              <a:t>it manipulate byte code</a:t>
+              <a:t>   because it manipulate byte code</a:t>
             </a:r>
           </a:p>
           <a:p>
@@ -10413,8 +10538,12 @@
               <a:buAutoNum type="arabicPeriod"/>
             </a:pPr>
             <a:r>
+              <a:rPr lang="en-US" sz="1600" b="1" u="sng" dirty="0" smtClean="0"/>
+              <a:t>Memory usage </a:t>
+            </a:r>
+            <a:r>
               <a:rPr lang="en-US" sz="1600" dirty="0" smtClean="0"/>
-              <a:t>Memory usage : it use more memory usage by generation class at runtime</a:t>
+              <a:t>: it use more memory usage by generation class at runtime</a:t>
             </a:r>
             <a:endParaRPr lang="en-US" sz="1600" dirty="0"/>
           </a:p>
@@ -10427,16 +10556,12 @@
               <a:t>3. </a:t>
             </a:r>
             <a:r>
+              <a:rPr lang="en-US" sz="1600" b="1" u="sng" dirty="0" smtClean="0"/>
+              <a:t>Library dependency  </a:t>
+            </a:r>
+            <a:r>
               <a:rPr lang="en-US" sz="1600" dirty="0" smtClean="0"/>
-              <a:t>Library dependency  : </a:t>
-            </a:r>
-            <a:r>
-              <a:rPr lang="en-US" sz="1600" dirty="0" smtClean="0"/>
-              <a:t>CGLIB </a:t>
-            </a:r>
-            <a:r>
-              <a:rPr lang="en-US" sz="1600" dirty="0" smtClean="0"/>
-              <a:t>is a third party library so you need to include it as dependency to project.</a:t>
+              <a:t>: CGLIB is a third party library so you need to include it as dependency to project.</a:t>
             </a:r>
           </a:p>
           <a:p>
@@ -10448,8 +10573,12 @@
               <a:t>4  </a:t>
             </a:r>
             <a:r>
+              <a:rPr lang="en-US" sz="1600" b="1" u="sng" dirty="0" smtClean="0"/>
+              <a:t>Complexity</a:t>
+            </a:r>
+            <a:r>
               <a:rPr lang="en-US" sz="1600" dirty="0" smtClean="0"/>
-              <a:t>Complexity : </a:t>
+              <a:t> : </a:t>
             </a:r>
             <a:r>
               <a:rPr lang="en-US" sz="1600" dirty="0"/>
@@ -10482,8 +10611,12 @@
               <a:t>5. </a:t>
             </a:r>
             <a:r>
+              <a:rPr lang="en-US" sz="1600" b="1" u="sng" dirty="0" smtClean="0"/>
+              <a:t>Compatibility</a:t>
+            </a:r>
+            <a:r>
               <a:rPr lang="en-US" sz="1600" dirty="0" smtClean="0"/>
-              <a:t>Compatibility : </a:t>
+              <a:t> : </a:t>
             </a:r>
             <a:r>
               <a:rPr lang="en-US" sz="1600" dirty="0"/>
@@ -10491,11 +10624,7 @@
             </a:r>
             <a:r>
               <a:rPr lang="en-US" sz="1600" dirty="0" smtClean="0"/>
-              <a:t>	             </a:t>
-            </a:r>
-            <a:r>
-              <a:rPr lang="en-US" sz="1600" dirty="0" smtClean="0"/>
-              <a:t>	            bytecode </a:t>
+              <a:t>	             	            bytecode </a:t>
             </a:r>
             <a:r>
               <a:rPr lang="en-US" sz="1600" dirty="0"/>
@@ -10503,19 +10632,7 @@
             </a:r>
             <a:r>
               <a:rPr lang="en-US" sz="1600" dirty="0" smtClean="0"/>
-              <a:t>.(for example it </a:t>
-            </a:r>
-            <a:r>
-              <a:rPr lang="en-US" sz="1600" dirty="0" smtClean="0"/>
-              <a:t>want </a:t>
-            </a:r>
-            <a:r>
-              <a:rPr lang="en-US" sz="1600" dirty="0" smtClean="0"/>
-              <a:t>to </a:t>
-            </a:r>
-            <a:r>
-              <a:rPr lang="en-US" sz="1600" dirty="0" smtClean="0"/>
-              <a:t>modify   	            </a:t>
+              <a:t>.(for example it want to modify   	            </a:t>
             </a:r>
             <a:r>
               <a:rPr lang="en-US" sz="1600" dirty="0" err="1" smtClean="0"/>
@@ -10523,11 +10640,7 @@
             </a:r>
             <a:r>
               <a:rPr lang="en-US" sz="1600" dirty="0" smtClean="0"/>
-              <a:t> </a:t>
-            </a:r>
-            <a:r>
-              <a:rPr lang="en-US" sz="1600" dirty="0" smtClean="0"/>
-              <a:t>package and for java version above 9</a:t>
+              <a:t> package and for java version above 9</a:t>
             </a:r>
           </a:p>
           <a:p>
@@ -10539,8 +10652,12 @@
               <a:t>6. </a:t>
             </a:r>
             <a:r>
+              <a:rPr lang="en-US" sz="1600" b="1" u="sng" dirty="0" smtClean="0"/>
+              <a:t>Maintenance</a:t>
+            </a:r>
+            <a:r>
               <a:rPr lang="en-US" sz="1600" dirty="0" smtClean="0"/>
-              <a:t>Maintenance : </a:t>
+              <a:t> : </a:t>
             </a:r>
             <a:r>
               <a:rPr lang="en-US" sz="1600" dirty="0"/>
@@ -10884,11 +11001,7 @@
             </a:br>
             <a:r>
               <a:rPr lang="en-US" sz="1400" dirty="0" smtClean="0"/>
-              <a:t>had </a:t>
-            </a:r>
-            <a:r>
-              <a:rPr lang="en-US" sz="1400" dirty="0" smtClean="0"/>
-              <a:t>some capability or restriction or track before request processed and so on</a:t>
+              <a:t>had some capability or restriction or track before request processed and so on</a:t>
             </a:r>
             <a:br>
               <a:rPr lang="en-US" sz="1400" dirty="0" smtClean="0"/>
@@ -10917,10 +11030,6 @@
             <a:r>
               <a:rPr lang="en-US" sz="1400" dirty="0" smtClean="0"/>
               <a:t>as you know lot of us wee using proxy for access to telegram </a:t>
-            </a:r>
-            <a:r>
-              <a:rPr lang="en-US" sz="1400" dirty="0" smtClean="0"/>
-              <a:t/>
             </a:r>
             <a:br>
               <a:rPr lang="en-US" sz="1400" dirty="0" smtClean="0"/>
@@ -11126,7 +11235,7 @@
               <a:t> </a:t>
             </a:r>
             <a:r>
-              <a:rPr lang="en-US" sz="1600" b="1" dirty="0" smtClean="0"/>
+              <a:rPr lang="en-US" sz="1600" b="1" u="sng" dirty="0" smtClean="0"/>
               <a:t>privacy</a:t>
             </a:r>
             <a:r>
@@ -11186,7 +11295,7 @@
               <a:t> </a:t>
             </a:r>
             <a:r>
-              <a:rPr lang="en-US" sz="1600" b="1" dirty="0" smtClean="0"/>
+              <a:rPr lang="en-US" sz="1600" b="1" u="sng" dirty="0" smtClean="0"/>
               <a:t>security</a:t>
             </a:r>
             <a:r>
@@ -11227,7 +11336,7 @@
               <a:t> </a:t>
             </a:r>
             <a:r>
-              <a:rPr lang="en-US" sz="1600" b="1" dirty="0" smtClean="0"/>
+              <a:rPr lang="en-US" sz="1600" b="1" u="sng" dirty="0" smtClean="0"/>
               <a:t>access control </a:t>
             </a:r>
             <a:r>
@@ -11268,7 +11377,7 @@
               <a:t> </a:t>
             </a:r>
             <a:r>
-              <a:rPr lang="en-US" sz="1600" b="1" dirty="0" smtClean="0"/>
+              <a:rPr lang="en-US" sz="1600" b="1" u="sng" dirty="0" smtClean="0"/>
               <a:t>Geographical Access </a:t>
             </a:r>
             <a:r>
@@ -11339,7 +11448,7 @@
               <a:t> </a:t>
             </a:r>
             <a:r>
-              <a:rPr lang="en-US" sz="1600" b="1" dirty="0" smtClean="0"/>
+              <a:rPr lang="en-US" sz="1600" b="1" u="sng" dirty="0" smtClean="0"/>
               <a:t>network Performance Optimization </a:t>
             </a:r>
             <a:r>
@@ -11445,11 +11554,7 @@
             </a:r>
             <a:r>
               <a:rPr lang="en-US" sz="1400" dirty="0" smtClean="0"/>
-              <a:t> </a:t>
-            </a:r>
-            <a:r>
-              <a:rPr lang="en-US" sz="1400" dirty="0" smtClean="0"/>
-              <a:t>your you don’t attended to class but your friend says present on chat box section .</a:t>
+              <a:t> your you don’t attended to class but your friend says present on chat box section .</a:t>
             </a:r>
             <a:r>
               <a:rPr lang="en-US" sz="1200" dirty="0" smtClean="0"/>
@@ -11700,15 +11805,7 @@
             </a:r>
             <a:r>
               <a:rPr lang="en-US" sz="1400" dirty="0" smtClean="0"/>
-              <a:t>let also for learn better dynamic proxy and </a:t>
-            </a:r>
-            <a:r>
-              <a:rPr lang="en-US" sz="1400" dirty="0" smtClean="0"/>
-              <a:t>JDK </a:t>
-            </a:r>
-            <a:r>
-              <a:rPr lang="en-US" sz="1400" dirty="0" smtClean="0"/>
-              <a:t>proxy lets a little deep dive into reflection in java</a:t>
+              <a:t>let also for learn better dynamic proxy and JDK proxy lets a little deep dive into reflection in java</a:t>
             </a:r>
             <a:br>
               <a:rPr lang="en-US" sz="1400" dirty="0" smtClean="0"/>
@@ -11784,11 +11881,7 @@
             </a:r>
             <a:r>
               <a:rPr lang="en-US" sz="1600" dirty="0" smtClean="0"/>
-              <a:t>you can obtain information about classes , interface , method , constructor at runtime it can be useful </a:t>
-            </a:r>
-            <a:r>
-              <a:rPr lang="en-US" sz="1600" dirty="0" smtClean="0"/>
-              <a:t>	for task</a:t>
+              <a:t>you can obtain information about classes , interface , method , constructor at runtime it can be useful 	for task</a:t>
             </a:r>
             <a:r>
               <a:rPr lang="en-US" sz="1600" dirty="0"/>
@@ -11796,11 +11889,7 @@
             </a:r>
             <a:r>
               <a:rPr lang="en-US" sz="1600" dirty="0" smtClean="0"/>
-              <a:t>for </a:t>
-            </a:r>
-            <a:r>
-              <a:rPr lang="en-US" sz="1600" dirty="0" smtClean="0"/>
-              <a:t>framework work with classes in flexible and  dynamic way</a:t>
+              <a:t>for framework work with classes in flexible and  dynamic way</a:t>
             </a:r>
             <a:br>
               <a:rPr lang="en-US" sz="1600" dirty="0" smtClean="0"/>
@@ -11825,11 +11914,7 @@
             </a:r>
             <a:r>
               <a:rPr lang="en-US" sz="1600" dirty="0" smtClean="0"/>
-              <a:t>(JDK </a:t>
-            </a:r>
-            <a:r>
-              <a:rPr lang="en-US" sz="1600" dirty="0" smtClean="0"/>
-              <a:t>proxy use these feature create instance of proxy class at runtime </a:t>
+              <a:t>(JDK proxy use these feature create instance of proxy class at runtime </a:t>
             </a:r>
             <a:br>
               <a:rPr lang="en-US" sz="1600" dirty="0" smtClean="0"/>
@@ -11865,11 +11950,7 @@
             </a:r>
             <a:r>
               <a:rPr lang="en-US" sz="1600" dirty="0" smtClean="0"/>
-              <a:t>invoke method Dynamically : reflection allow you to invoke method on object dynamically  . This is useful when you want to call </a:t>
-            </a:r>
-            <a:r>
-              <a:rPr lang="en-US" sz="1600" dirty="0" smtClean="0"/>
-              <a:t>	method</a:t>
+              <a:t>invoke method Dynamically : reflection allow you to invoke method on object dynamically  . This is useful when you want to call 	method</a:t>
             </a:r>
             <a:r>
               <a:rPr lang="en-US" sz="1600" dirty="0"/>
@@ -11877,11 +11958,7 @@
             </a:r>
             <a:r>
               <a:rPr lang="en-US" sz="1600" dirty="0" smtClean="0"/>
-              <a:t>base </a:t>
-            </a:r>
-            <a:r>
-              <a:rPr lang="en-US" sz="1600" dirty="0" smtClean="0"/>
-              <a:t>on user input</a:t>
+              <a:t>base on user input</a:t>
             </a:r>
             <a:r>
               <a:rPr lang="en-US" sz="1200" b="1" dirty="0" smtClean="0"/>
@@ -12196,11 +12273,7 @@
             </a:r>
             <a:r>
               <a:rPr lang="en-US" sz="1300" dirty="0" smtClean="0"/>
-              <a:t> </a:t>
-            </a:r>
-            <a:r>
-              <a:rPr lang="en-US" sz="1300" dirty="0" smtClean="0"/>
-              <a:t>how dynamic proxy work</a:t>
+              <a:t> how dynamic proxy work</a:t>
             </a:r>
             <a:endParaRPr lang="en-US" sz="1300" dirty="0"/>
           </a:p>
@@ -12228,7 +12301,7 @@
         </p:blipFill>
         <p:spPr>
           <a:xfrm>
-            <a:off x="132950" y="929395"/>
+            <a:off x="444034" y="1258946"/>
             <a:ext cx="4987690" cy="3380138"/>
           </a:xfrm>
           <a:prstGeom prst="rect">
@@ -12252,7 +12325,7 @@
         </p:blipFill>
         <p:spPr>
           <a:xfrm>
-            <a:off x="5345910" y="840375"/>
+            <a:off x="5660790" y="896936"/>
             <a:ext cx="6379061" cy="4104158"/>
           </a:xfrm>
           <a:prstGeom prst="rect">
@@ -12325,11 +12398,7 @@
             </a:r>
             <a:r>
               <a:rPr lang="en-US" sz="1600" b="1" dirty="0" smtClean="0"/>
-              <a:t>What </a:t>
-            </a:r>
-            <a:r>
-              <a:rPr lang="en-US" sz="1600" b="1" dirty="0" smtClean="0"/>
-              <a:t>is dynamic proxy ?  What are different type ?How transactional work behind scene? </a:t>
+              <a:t>What is dynamic proxy ?  What are different type ?How transactional work behind scene? </a:t>
             </a:r>
             <a:br>
               <a:rPr lang="en-US" sz="1600" b="1" dirty="0" smtClean="0"/>
@@ -12485,15 +12554,7 @@
             </a:br>
             <a:r>
               <a:rPr lang="en-US" sz="1400" dirty="0" smtClean="0"/>
-              <a:t>weaving : is process of integrating aspect with main application code  . It can done on different stage. Compile time , load time , run time . </a:t>
-            </a:r>
-            <a:r>
-              <a:rPr lang="en-US" sz="1400" dirty="0" smtClean="0"/>
-              <a:t>JDK  </a:t>
-            </a:r>
-            <a:r>
-              <a:rPr lang="en-US" sz="1400" dirty="0" smtClean="0"/>
-              <a:t>weaving at runtime</a:t>
+              <a:t>weaving : is process of integrating aspect with main application code  . It can done on different stage. Compile time , load time , run time . JDK  weaving at runtime</a:t>
             </a:r>
             <a:br>
               <a:rPr lang="en-US" sz="1400" dirty="0" smtClean="0"/>

</xml_diff>